<commit_message>
Change translation of 'modulation'
</commit_message>
<xml_diff>
--- a/WiFi/Wi-Fi_Presentation.pptx
+++ b/WiFi/Wi-Fi_Presentation.pptx
@@ -45,7 +45,7 @@
       <p:regular r:id="rId25"/>
     </p:embeddedFont>
     <p:embeddedFont>
-      <p:font typeface="Encode Sans" panose="020B0604020202020204" charset="0"/>
+      <p:font typeface="Encode Sans"/>
       <p:regular r:id="rId26"/>
       <p:bold r:id="rId27"/>
     </p:embeddedFont>
@@ -9879,13 +9879,13 @@
   <p:clrMapOvr>
     <a:masterClrMapping/>
   </p:clrMapOvr>
-  <mc:AlternateContent xmlns:mc="http://schemas.openxmlformats.org/markup-compatibility/2006">
-    <mc:Choice xmlns:p14="http://schemas.microsoft.com/office/powerpoint/2010/main" Requires="p14">
+  <mc:AlternateContent xmlns:mc="http://schemas.openxmlformats.org/markup-compatibility/2006" xmlns:p14="http://schemas.microsoft.com/office/powerpoint/2010/main">
+    <mc:Choice Requires="p14">
       <p:transition spd="slow" p14:dur="1500">
         <p:split orient="vert"/>
       </p:transition>
     </mc:Choice>
-    <mc:Fallback>
+    <mc:Fallback xmlns="">
       <p:transition spd="slow">
         <p:split orient="vert"/>
       </p:transition>
@@ -12403,7 +12403,7 @@
                 <a:latin typeface="Vazir" panose="020B0603030804020204" pitchFamily="34" charset="-78"/>
                 <a:cs typeface="Vazir" panose="020B0603030804020204" pitchFamily="34" charset="-78"/>
               </a:rPr>
-              <a:t>فرمت‌های ماژولاسیون لایه‌ی فیزیکی</a:t>
+              <a:t>فرمت‌های مدولاسیون لایه‌ی فیزیکی</a:t>
             </a:r>
             <a:endParaRPr lang="en-US" sz="3000" dirty="0">
               <a:latin typeface="Vazir" panose="020B0603030804020204" pitchFamily="34" charset="-78"/>
@@ -12529,13 +12529,13 @@
   <p:clrMapOvr>
     <a:masterClrMapping/>
   </p:clrMapOvr>
-  <mc:AlternateContent xmlns:mc="http://schemas.openxmlformats.org/markup-compatibility/2006">
-    <mc:Choice xmlns:p14="http://schemas.microsoft.com/office/powerpoint/2010/main" Requires="p14">
+  <mc:AlternateContent xmlns:mc="http://schemas.openxmlformats.org/markup-compatibility/2006" xmlns:p14="http://schemas.microsoft.com/office/powerpoint/2010/main">
+    <mc:Choice Requires="p14">
       <p:transition spd="slow" p14:dur="2000">
         <p14:reveal/>
       </p:transition>
     </mc:Choice>
-    <mc:Fallback>
+    <mc:Fallback xmlns="">
       <p:transition spd="slow">
         <p:fade/>
       </p:transition>
@@ -12600,7 +12600,7 @@
                 <a:latin typeface="Vazir" panose="020B0603030804020204" pitchFamily="34" charset="-78"/>
                 <a:cs typeface="Vazir" panose="020B0603030804020204" pitchFamily="34" charset="-78"/>
               </a:rPr>
-              <a:t>فرمت‌های ماژولاسیون لایه‌ی فیزیکی</a:t>
+              <a:t>فرمت‌های مدولاسیون لایه‌ی فیزیکی</a:t>
             </a:r>
             <a:endParaRPr lang="en-US" sz="3000" dirty="0">
               <a:latin typeface="Vazir" panose="020B0603030804020204" pitchFamily="34" charset="-78"/>
@@ -12866,13 +12866,13 @@
   <p:clrMapOvr>
     <a:masterClrMapping/>
   </p:clrMapOvr>
-  <mc:AlternateContent xmlns:mc="http://schemas.openxmlformats.org/markup-compatibility/2006">
-    <mc:Choice xmlns:p159="http://schemas.microsoft.com/office/powerpoint/2015/09/main" Requires="p159">
+  <mc:AlternateContent xmlns:mc="http://schemas.openxmlformats.org/markup-compatibility/2006" xmlns:p159="http://schemas.microsoft.com/office/powerpoint/2015/09/main">
+    <mc:Choice Requires="p159">
       <p:transition xmlns:p14="http://schemas.microsoft.com/office/powerpoint/2010/main" spd="slow" p14:dur="2000">
         <p159:morph option="byObject"/>
       </p:transition>
     </mc:Choice>
-    <mc:Fallback>
+    <mc:Fallback xmlns="">
       <p:transition spd="slow">
         <p:fade/>
       </p:transition>
@@ -13257,7 +13257,7 @@
                 <a:latin typeface="Vazir" panose="020B0603030804020204" pitchFamily="34" charset="-78"/>
                 <a:cs typeface="Vazir" panose="020B0603030804020204" pitchFamily="34" charset="-78"/>
               </a:rPr>
-              <a:t>فرمت‌های ماژولاسیون لایه‌ی فیزیکی</a:t>
+              <a:t>فرمت‌های مدولاسیون لایه‌ی فیزیکی</a:t>
             </a:r>
             <a:endParaRPr lang="en-US" sz="3000" dirty="0">
               <a:latin typeface="Vazir" panose="020B0603030804020204" pitchFamily="34" charset="-78"/>
@@ -14115,13 +14115,13 @@
   <p:clrMapOvr>
     <a:masterClrMapping/>
   </p:clrMapOvr>
-  <mc:AlternateContent xmlns:mc="http://schemas.openxmlformats.org/markup-compatibility/2006">
-    <mc:Choice xmlns:p159="http://schemas.microsoft.com/office/powerpoint/2015/09/main" Requires="p159">
+  <mc:AlternateContent xmlns:mc="http://schemas.openxmlformats.org/markup-compatibility/2006" xmlns:p159="http://schemas.microsoft.com/office/powerpoint/2015/09/main">
+    <mc:Choice Requires="p159">
       <p:transition xmlns:p14="http://schemas.microsoft.com/office/powerpoint/2010/main" spd="slow" p14:dur="2000">
         <p159:morph option="byObject"/>
       </p:transition>
     </mc:Choice>
-    <mc:Fallback>
+    <mc:Fallback xmlns="">
       <p:transition spd="slow">
         <p:fade/>
       </p:transition>
@@ -14703,13 +14703,13 @@
   <p:clrMapOvr>
     <a:masterClrMapping/>
   </p:clrMapOvr>
-  <mc:AlternateContent xmlns:mc="http://schemas.openxmlformats.org/markup-compatibility/2006">
-    <mc:Choice xmlns:p159="http://schemas.microsoft.com/office/powerpoint/2015/09/main" Requires="p159">
+  <mc:AlternateContent xmlns:mc="http://schemas.openxmlformats.org/markup-compatibility/2006" xmlns:p159="http://schemas.microsoft.com/office/powerpoint/2015/09/main">
+    <mc:Choice Requires="p159">
       <p:transition xmlns:p14="http://schemas.microsoft.com/office/powerpoint/2010/main" spd="slow" p14:dur="2000">
         <p159:morph option="byObject"/>
       </p:transition>
     </mc:Choice>
-    <mc:Fallback>
+    <mc:Fallback xmlns="">
       <p:transition spd="slow">
         <p:fade/>
       </p:transition>
@@ -15580,7 +15580,7 @@
                   <a:latin typeface="Vazir" panose="020B0603030804020204" pitchFamily="34" charset="-78"/>
                   <a:cs typeface="Vazir" panose="020B0603030804020204" pitchFamily="34" charset="-78"/>
                 </a:rPr>
-                <a:t>فرمت‌های ماژولاسیون لایه‌ی فیزیکی</a:t>
+                <a:t>فرمت‌های مدولاسیون لایه‌ی فیزیکی</a:t>
               </a:r>
               <a:endParaRPr lang="en-US" sz="2400" dirty="0">
                 <a:solidFill>
@@ -16321,13 +16321,13 @@
   <p:clrMapOvr>
     <a:masterClrMapping/>
   </p:clrMapOvr>
-  <mc:AlternateContent xmlns:mc="http://schemas.openxmlformats.org/markup-compatibility/2006">
-    <mc:Choice xmlns:p159="http://schemas.microsoft.com/office/powerpoint/2015/09/main" Requires="p159">
+  <mc:AlternateContent xmlns:mc="http://schemas.openxmlformats.org/markup-compatibility/2006" xmlns:p159="http://schemas.microsoft.com/office/powerpoint/2015/09/main">
+    <mc:Choice Requires="p159">
       <p:transition xmlns:p14="http://schemas.microsoft.com/office/powerpoint/2010/main" spd="slow" p14:dur="2000">
         <p159:morph option="byObject"/>
       </p:transition>
     </mc:Choice>
-    <mc:Fallback>
+    <mc:Fallback xmlns="">
       <p:transition spd="slow">
         <p:fade/>
       </p:transition>
@@ -17368,13 +17368,13 @@
   <p:clrMapOvr>
     <a:masterClrMapping/>
   </p:clrMapOvr>
-  <mc:AlternateContent xmlns:mc="http://schemas.openxmlformats.org/markup-compatibility/2006">
-    <mc:Choice xmlns:p14="http://schemas.microsoft.com/office/powerpoint/2010/main" Requires="p14">
+  <mc:AlternateContent xmlns:mc="http://schemas.openxmlformats.org/markup-compatibility/2006" xmlns:p14="http://schemas.microsoft.com/office/powerpoint/2010/main">
+    <mc:Choice Requires="p14">
       <p:transition spd="slow" p14:dur="3400">
         <p14:reveal/>
       </p:transition>
     </mc:Choice>
-    <mc:Fallback>
+    <mc:Fallback xmlns="">
       <p:transition spd="slow">
         <p:fade/>
       </p:transition>
@@ -19214,7 +19214,7 @@
                   <a:latin typeface="Vazir" panose="020B0603030804020204" pitchFamily="34" charset="-78"/>
                   <a:cs typeface="Vazir" panose="020B0603030804020204" pitchFamily="34" charset="-78"/>
                 </a:rPr>
-                <a:t>ترکیــــــــب ماژولاسیون نسخه‌های  </a:t>
+                <a:t>ترکیــــــــب مدولاسیون نسخه‌های  </a:t>
               </a:r>
               <a:r>
                 <a:rPr lang="en-US" dirty="0">
@@ -20120,13 +20120,13 @@
   <p:clrMapOvr>
     <a:masterClrMapping/>
   </p:clrMapOvr>
-  <mc:AlternateContent xmlns:mc="http://schemas.openxmlformats.org/markup-compatibility/2006">
-    <mc:Choice xmlns:p14="http://schemas.microsoft.com/office/powerpoint/2010/main" Requires="p14">
+  <mc:AlternateContent xmlns:mc="http://schemas.openxmlformats.org/markup-compatibility/2006" xmlns:p14="http://schemas.microsoft.com/office/powerpoint/2010/main">
+    <mc:Choice Requires="p14">
       <p:transition spd="slow" p14:dur="1500">
         <p:split orient="vert"/>
       </p:transition>
     </mc:Choice>
-    <mc:Fallback>
+    <mc:Fallback xmlns="">
       <p:transition spd="slow">
         <p:split orient="vert"/>
       </p:transition>
@@ -20918,13 +20918,13 @@
   <p:clrMapOvr>
     <a:masterClrMapping/>
   </p:clrMapOvr>
-  <mc:AlternateContent xmlns:mc="http://schemas.openxmlformats.org/markup-compatibility/2006">
-    <mc:Choice xmlns:p14="http://schemas.microsoft.com/office/powerpoint/2010/main" Requires="p14">
+  <mc:AlternateContent xmlns:mc="http://schemas.openxmlformats.org/markup-compatibility/2006" xmlns:p14="http://schemas.microsoft.com/office/powerpoint/2010/main">
+    <mc:Choice Requires="p14">
       <p:transition spd="slow" p14:dur="3400">
         <p14:reveal/>
       </p:transition>
     </mc:Choice>
-    <mc:Fallback>
+    <mc:Fallback xmlns="">
       <p:transition spd="slow">
         <p:fade/>
       </p:transition>
@@ -21496,13 +21496,13 @@
   <p:clrMapOvr>
     <a:masterClrMapping/>
   </p:clrMapOvr>
-  <mc:AlternateContent xmlns:mc="http://schemas.openxmlformats.org/markup-compatibility/2006">
-    <mc:Choice xmlns:p14="http://schemas.microsoft.com/office/powerpoint/2010/main" Requires="p14">
+  <mc:AlternateContent xmlns:mc="http://schemas.openxmlformats.org/markup-compatibility/2006" xmlns:p14="http://schemas.microsoft.com/office/powerpoint/2010/main">
+    <mc:Choice Requires="p14">
       <p:transition spd="slow" p14:dur="3400">
         <p14:reveal/>
       </p:transition>
     </mc:Choice>
-    <mc:Fallback>
+    <mc:Fallback xmlns="">
       <p:transition spd="slow">
         <p:fade/>
       </p:transition>
@@ -21946,13 +21946,13 @@
   <p:clrMapOvr>
     <a:masterClrMapping/>
   </p:clrMapOvr>
-  <mc:AlternateContent xmlns:mc="http://schemas.openxmlformats.org/markup-compatibility/2006">
-    <mc:Choice xmlns:p14="http://schemas.microsoft.com/office/powerpoint/2010/main" Requires="p14">
+  <mc:AlternateContent xmlns:mc="http://schemas.openxmlformats.org/markup-compatibility/2006" xmlns:p14="http://schemas.microsoft.com/office/powerpoint/2010/main">
+    <mc:Choice Requires="p14">
       <p:transition spd="slow" p14:dur="3400">
         <p14:reveal/>
       </p:transition>
     </mc:Choice>
-    <mc:Fallback>
+    <mc:Fallback xmlns="">
       <p:transition spd="slow">
         <p:fade/>
       </p:transition>

</xml_diff>